<commit_message>
Add examples for presentation Add frames to vm
</commit_message>
<xml_diff>
--- a/vm/vm.pptx
+++ b/vm/vm.pptx
@@ -104,6 +104,11 @@
       </a:defRPr>
     </a:lvl9pPr>
   </p:defaultTextStyle>
+  <p:extLst>
+    <p:ext uri="{EFAFB233-063F-42B5-8137-9DF3F51BA10A}">
+      <p15:sldGuideLst xmlns:p15="http://schemas.microsoft.com/office/powerpoint/2012/main"/>
+    </p:ext>
+  </p:extLst>
 </p:presentation>
 </file>
 
@@ -3254,8 +3259,8 @@
         </p:nvSpPr>
         <p:spPr>
           <a:xfrm>
-            <a:off x="5795677" y="1228177"/>
-            <a:ext cx="1472184" cy="4564642"/>
+            <a:off x="5795677" y="1780389"/>
+            <a:ext cx="1472184" cy="4012430"/>
           </a:xfrm>
           <a:prstGeom prst="rect">
             <a:avLst/>
@@ -3286,17 +3291,9 @@
           <a:p>
             <a:pPr algn="ctr"/>
             <a:r>
-              <a:rPr lang="de-DE" dirty="0" err="1"/>
+              <a:rPr lang="de-DE" dirty="0" err="1" smtClean="0"/>
               <a:t>Execution</a:t>
             </a:r>
-            <a:endParaRPr lang="de-DE" dirty="0"/>
-          </a:p>
-          <a:p>
-            <a:pPr algn="ctr"/>
-            <a:endParaRPr lang="de-DE" dirty="0"/>
-          </a:p>
-          <a:p>
-            <a:pPr algn="ctr"/>
             <a:endParaRPr lang="de-DE" dirty="0"/>
           </a:p>
           <a:p>
@@ -3362,7 +3359,7 @@
         <p:spPr>
           <a:xfrm flipH="1">
             <a:off x="1781461" y="2894171"/>
-            <a:ext cx="4014216" cy="0"/>
+            <a:ext cx="2264664" cy="0"/>
           </a:xfrm>
           <a:prstGeom prst="straightConnector1">
             <a:avLst/>
@@ -3398,7 +3395,7 @@
         <p:spPr>
           <a:xfrm flipH="1">
             <a:off x="1781461" y="3732371"/>
-            <a:ext cx="4014216" cy="0"/>
+            <a:ext cx="2264664" cy="0"/>
           </a:xfrm>
           <a:prstGeom prst="straightConnector1">
             <a:avLst/>
@@ -3434,7 +3431,7 @@
         <p:spPr>
           <a:xfrm>
             <a:off x="1781461" y="4320110"/>
-            <a:ext cx="4014216" cy="0"/>
+            <a:ext cx="2264664" cy="0"/>
           </a:xfrm>
           <a:prstGeom prst="straightConnector1">
             <a:avLst/>
@@ -3587,7 +3584,7 @@
         <p:spPr>
           <a:xfrm>
             <a:off x="1781461" y="1782175"/>
-            <a:ext cx="4014216" cy="0"/>
+            <a:ext cx="2264664" cy="0"/>
           </a:xfrm>
           <a:prstGeom prst="straightConnector1">
             <a:avLst/>
@@ -3652,7 +3649,7 @@
         <p:spPr>
           <a:xfrm flipH="1">
             <a:off x="1781461" y="5408771"/>
-            <a:ext cx="4014216" cy="0"/>
+            <a:ext cx="2264664" cy="0"/>
           </a:xfrm>
           <a:prstGeom prst="straightConnector1">
             <a:avLst/>
@@ -3762,6 +3759,257 @@
           </a:p>
         </p:txBody>
       </p:sp>
+      <p:cxnSp>
+        <p:nvCxnSpPr>
+          <p:cNvPr id="25" name="Gerade Verbindung mit Pfeil 24"/>
+          <p:cNvCxnSpPr/>
+          <p:nvPr/>
+        </p:nvCxnSpPr>
+        <p:spPr>
+          <a:xfrm>
+            <a:off x="4113181" y="4320110"/>
+            <a:ext cx="1682496" cy="0"/>
+          </a:xfrm>
+          <a:prstGeom prst="straightConnector1">
+            <a:avLst/>
+          </a:prstGeom>
+          <a:ln w="57150">
+            <a:solidFill>
+              <a:schemeClr val="tx1"/>
+            </a:solidFill>
+            <a:tailEnd type="triangle"/>
+          </a:ln>
+        </p:spPr>
+        <p:style>
+          <a:lnRef idx="1">
+            <a:schemeClr val="accent1"/>
+          </a:lnRef>
+          <a:fillRef idx="0">
+            <a:schemeClr val="accent1"/>
+          </a:fillRef>
+          <a:effectRef idx="0">
+            <a:schemeClr val="accent1"/>
+          </a:effectRef>
+          <a:fontRef idx="minor">
+            <a:schemeClr val="tx1"/>
+          </a:fontRef>
+        </p:style>
+      </p:cxnSp>
+      <p:cxnSp>
+        <p:nvCxnSpPr>
+          <p:cNvPr id="30" name="Gerade Verbindung mit Pfeil 29"/>
+          <p:cNvCxnSpPr/>
+          <p:nvPr/>
+        </p:nvCxnSpPr>
+        <p:spPr>
+          <a:xfrm flipH="1">
+            <a:off x="4113181" y="2894171"/>
+            <a:ext cx="1682496" cy="0"/>
+          </a:xfrm>
+          <a:prstGeom prst="straightConnector1">
+            <a:avLst/>
+          </a:prstGeom>
+          <a:ln w="57150">
+            <a:solidFill>
+              <a:schemeClr val="tx1"/>
+            </a:solidFill>
+            <a:tailEnd type="triangle"/>
+          </a:ln>
+        </p:spPr>
+        <p:style>
+          <a:lnRef idx="1">
+            <a:schemeClr val="accent1"/>
+          </a:lnRef>
+          <a:fillRef idx="0">
+            <a:schemeClr val="accent1"/>
+          </a:fillRef>
+          <a:effectRef idx="0">
+            <a:schemeClr val="accent1"/>
+          </a:effectRef>
+          <a:fontRef idx="minor">
+            <a:schemeClr val="tx1"/>
+          </a:fontRef>
+        </p:style>
+      </p:cxnSp>
+      <p:cxnSp>
+        <p:nvCxnSpPr>
+          <p:cNvPr id="31" name="Gerade Verbindung mit Pfeil 30"/>
+          <p:cNvCxnSpPr/>
+          <p:nvPr/>
+        </p:nvCxnSpPr>
+        <p:spPr>
+          <a:xfrm flipH="1">
+            <a:off x="4113181" y="3720153"/>
+            <a:ext cx="1682496" cy="0"/>
+          </a:xfrm>
+          <a:prstGeom prst="straightConnector1">
+            <a:avLst/>
+          </a:prstGeom>
+          <a:ln w="57150">
+            <a:solidFill>
+              <a:schemeClr val="tx1"/>
+            </a:solidFill>
+            <a:tailEnd type="triangle"/>
+          </a:ln>
+        </p:spPr>
+        <p:style>
+          <a:lnRef idx="1">
+            <a:schemeClr val="accent1"/>
+          </a:lnRef>
+          <a:fillRef idx="0">
+            <a:schemeClr val="accent1"/>
+          </a:fillRef>
+          <a:effectRef idx="0">
+            <a:schemeClr val="accent1"/>
+          </a:effectRef>
+          <a:fontRef idx="minor">
+            <a:schemeClr val="tx1"/>
+          </a:fontRef>
+        </p:style>
+      </p:cxnSp>
+      <p:cxnSp>
+        <p:nvCxnSpPr>
+          <p:cNvPr id="32" name="Gerade Verbindung mit Pfeil 31"/>
+          <p:cNvCxnSpPr/>
+          <p:nvPr/>
+        </p:nvCxnSpPr>
+        <p:spPr>
+          <a:xfrm flipH="1">
+            <a:off x="4113181" y="5408771"/>
+            <a:ext cx="1682496" cy="0"/>
+          </a:xfrm>
+          <a:prstGeom prst="straightConnector1">
+            <a:avLst/>
+          </a:prstGeom>
+          <a:ln w="57150">
+            <a:solidFill>
+              <a:schemeClr val="tx1"/>
+            </a:solidFill>
+            <a:tailEnd type="triangle"/>
+          </a:ln>
+        </p:spPr>
+        <p:style>
+          <a:lnRef idx="1">
+            <a:schemeClr val="accent1"/>
+          </a:lnRef>
+          <a:fillRef idx="0">
+            <a:schemeClr val="accent1"/>
+          </a:fillRef>
+          <a:effectRef idx="0">
+            <a:schemeClr val="accent1"/>
+          </a:effectRef>
+          <a:fontRef idx="minor">
+            <a:schemeClr val="tx1"/>
+          </a:fontRef>
+        </p:style>
+      </p:cxnSp>
+      <p:cxnSp>
+        <p:nvCxnSpPr>
+          <p:cNvPr id="33" name="Gerade Verbindung mit Pfeil 32"/>
+          <p:cNvCxnSpPr/>
+          <p:nvPr/>
+        </p:nvCxnSpPr>
+        <p:spPr>
+          <a:xfrm>
+            <a:off x="4113181" y="1780389"/>
+            <a:ext cx="1682496" cy="0"/>
+          </a:xfrm>
+          <a:prstGeom prst="straightConnector1">
+            <a:avLst/>
+          </a:prstGeom>
+          <a:ln w="57150">
+            <a:solidFill>
+              <a:schemeClr val="tx1"/>
+            </a:solidFill>
+            <a:tailEnd type="triangle"/>
+          </a:ln>
+        </p:spPr>
+        <p:style>
+          <a:lnRef idx="1">
+            <a:schemeClr val="accent1"/>
+          </a:lnRef>
+          <a:fillRef idx="0">
+            <a:schemeClr val="accent1"/>
+          </a:fillRef>
+          <a:effectRef idx="0">
+            <a:schemeClr val="accent1"/>
+          </a:effectRef>
+          <a:fontRef idx="minor">
+            <a:schemeClr val="tx1"/>
+          </a:fontRef>
+        </p:style>
+      </p:cxnSp>
+      <p:cxnSp>
+        <p:nvCxnSpPr>
+          <p:cNvPr id="19" name="Gerader Verbinder 18"/>
+          <p:cNvCxnSpPr/>
+          <p:nvPr/>
+        </p:nvCxnSpPr>
+        <p:spPr>
+          <a:xfrm>
+            <a:off x="4113181" y="1228177"/>
+            <a:ext cx="736375" cy="0"/>
+          </a:xfrm>
+          <a:prstGeom prst="line">
+            <a:avLst/>
+          </a:prstGeom>
+          <a:ln w="57150">
+            <a:solidFill>
+              <a:schemeClr val="tx1"/>
+            </a:solidFill>
+          </a:ln>
+        </p:spPr>
+        <p:style>
+          <a:lnRef idx="1">
+            <a:schemeClr val="accent1"/>
+          </a:lnRef>
+          <a:fillRef idx="0">
+            <a:schemeClr val="accent1"/>
+          </a:fillRef>
+          <a:effectRef idx="0">
+            <a:schemeClr val="accent1"/>
+          </a:effectRef>
+          <a:fontRef idx="minor">
+            <a:schemeClr val="tx1"/>
+          </a:fontRef>
+        </p:style>
+      </p:cxnSp>
+      <p:cxnSp>
+        <p:nvCxnSpPr>
+          <p:cNvPr id="37" name="Gerade Verbindung mit Pfeil 36"/>
+          <p:cNvCxnSpPr/>
+          <p:nvPr/>
+        </p:nvCxnSpPr>
+        <p:spPr>
+          <a:xfrm>
+            <a:off x="4849556" y="1228177"/>
+            <a:ext cx="0" cy="552212"/>
+          </a:xfrm>
+          <a:prstGeom prst="straightConnector1">
+            <a:avLst/>
+          </a:prstGeom>
+          <a:ln w="57150">
+            <a:solidFill>
+              <a:schemeClr val="tx1"/>
+            </a:solidFill>
+            <a:tailEnd type="triangle"/>
+          </a:ln>
+        </p:spPr>
+        <p:style>
+          <a:lnRef idx="1">
+            <a:schemeClr val="accent1"/>
+          </a:lnRef>
+          <a:fillRef idx="0">
+            <a:schemeClr val="accent1"/>
+          </a:fillRef>
+          <a:effectRef idx="0">
+            <a:schemeClr val="accent1"/>
+          </a:effectRef>
+          <a:fontRef idx="minor">
+            <a:schemeClr val="tx1"/>
+          </a:fontRef>
+        </p:style>
+      </p:cxnSp>
     </p:spTree>
     <p:extLst>
       <p:ext uri="{BB962C8B-B14F-4D97-AF65-F5344CB8AC3E}">

</xml_diff>